<commit_message>
Updated last scatter plot
</commit_message>
<xml_diff>
--- a/Housing Trends_GK.pptx
+++ b/Housing Trends_GK.pptx
@@ -307,7 +307,7 @@
           <a:p>
             <a:fld id="{3F2912A6-9505-4C94-BCDB-495CA5B0D52E}" type="datetimeFigureOut">
               <a:rPr lang="en-US" smtClean="0"/>
-              <a:t>7/26/2023</a:t>
+              <a:t>7/27/2023</a:t>
             </a:fld>
             <a:endParaRPr lang="en-US"/>
           </a:p>
@@ -582,7 +582,7 @@
           <a:p>
             <a:fld id="{3F2912A6-9505-4C94-BCDB-495CA5B0D52E}" type="datetimeFigureOut">
               <a:rPr lang="en-US" smtClean="0"/>
-              <a:t>7/26/2023</a:t>
+              <a:t>7/27/2023</a:t>
             </a:fld>
             <a:endParaRPr lang="en-US"/>
           </a:p>
@@ -776,7 +776,7 @@
           <a:p>
             <a:fld id="{3F2912A6-9505-4C94-BCDB-495CA5B0D52E}" type="datetimeFigureOut">
               <a:rPr lang="en-US" smtClean="0"/>
-              <a:t>7/26/2023</a:t>
+              <a:t>7/27/2023</a:t>
             </a:fld>
             <a:endParaRPr lang="en-US"/>
           </a:p>
@@ -1049,7 +1049,7 @@
           <a:p>
             <a:fld id="{3F2912A6-9505-4C94-BCDB-495CA5B0D52E}" type="datetimeFigureOut">
               <a:rPr lang="en-US" smtClean="0"/>
-              <a:t>7/26/2023</a:t>
+              <a:t>7/27/2023</a:t>
             </a:fld>
             <a:endParaRPr lang="en-US"/>
           </a:p>
@@ -1390,7 +1390,7 @@
           <a:p>
             <a:fld id="{3F2912A6-9505-4C94-BCDB-495CA5B0D52E}" type="datetimeFigureOut">
               <a:rPr lang="en-US" smtClean="0"/>
-              <a:t>7/26/2023</a:t>
+              <a:t>7/27/2023</a:t>
             </a:fld>
             <a:endParaRPr lang="en-US"/>
           </a:p>
@@ -2013,7 +2013,7 @@
           <a:p>
             <a:fld id="{3F2912A6-9505-4C94-BCDB-495CA5B0D52E}" type="datetimeFigureOut">
               <a:rPr lang="en-US" smtClean="0"/>
-              <a:t>7/26/2023</a:t>
+              <a:t>7/27/2023</a:t>
             </a:fld>
             <a:endParaRPr lang="en-US"/>
           </a:p>
@@ -2873,7 +2873,7 @@
           <a:p>
             <a:fld id="{3F2912A6-9505-4C94-BCDB-495CA5B0D52E}" type="datetimeFigureOut">
               <a:rPr lang="en-US" smtClean="0"/>
-              <a:t>7/26/2023</a:t>
+              <a:t>7/27/2023</a:t>
             </a:fld>
             <a:endParaRPr lang="en-US"/>
           </a:p>
@@ -3043,7 +3043,7 @@
           <a:p>
             <a:fld id="{3F2912A6-9505-4C94-BCDB-495CA5B0D52E}" type="datetimeFigureOut">
               <a:rPr lang="en-US" smtClean="0"/>
-              <a:t>7/26/2023</a:t>
+              <a:t>7/27/2023</a:t>
             </a:fld>
             <a:endParaRPr lang="en-US"/>
           </a:p>
@@ -3223,7 +3223,7 @@
           <a:p>
             <a:fld id="{3F2912A6-9505-4C94-BCDB-495CA5B0D52E}" type="datetimeFigureOut">
               <a:rPr lang="en-US" smtClean="0"/>
-              <a:t>7/26/2023</a:t>
+              <a:t>7/27/2023</a:t>
             </a:fld>
             <a:endParaRPr lang="en-US"/>
           </a:p>
@@ -3393,7 +3393,7 @@
           <a:p>
             <a:fld id="{3F2912A6-9505-4C94-BCDB-495CA5B0D52E}" type="datetimeFigureOut">
               <a:rPr lang="en-US" smtClean="0"/>
-              <a:t>7/26/2023</a:t>
+              <a:t>7/27/2023</a:t>
             </a:fld>
             <a:endParaRPr lang="en-US"/>
           </a:p>
@@ -3640,7 +3640,7 @@
           <a:p>
             <a:fld id="{3F2912A6-9505-4C94-BCDB-495CA5B0D52E}" type="datetimeFigureOut">
               <a:rPr lang="en-US" smtClean="0"/>
-              <a:t>7/26/2023</a:t>
+              <a:t>7/27/2023</a:t>
             </a:fld>
             <a:endParaRPr lang="en-US"/>
           </a:p>
@@ -3932,7 +3932,7 @@
           <a:p>
             <a:fld id="{3F2912A6-9505-4C94-BCDB-495CA5B0D52E}" type="datetimeFigureOut">
               <a:rPr lang="en-US" smtClean="0"/>
-              <a:t>7/26/2023</a:t>
+              <a:t>7/27/2023</a:t>
             </a:fld>
             <a:endParaRPr lang="en-US"/>
           </a:p>
@@ -4376,7 +4376,7 @@
           <a:p>
             <a:fld id="{3F2912A6-9505-4C94-BCDB-495CA5B0D52E}" type="datetimeFigureOut">
               <a:rPr lang="en-US" smtClean="0"/>
-              <a:t>7/26/2023</a:t>
+              <a:t>7/27/2023</a:t>
             </a:fld>
             <a:endParaRPr lang="en-US"/>
           </a:p>
@@ -4494,7 +4494,7 @@
           <a:p>
             <a:fld id="{3F2912A6-9505-4C94-BCDB-495CA5B0D52E}" type="datetimeFigureOut">
               <a:rPr lang="en-US" smtClean="0"/>
-              <a:t>7/26/2023</a:t>
+              <a:t>7/27/2023</a:t>
             </a:fld>
             <a:endParaRPr lang="en-US"/>
           </a:p>
@@ -4589,7 +4589,7 @@
           <a:p>
             <a:fld id="{3F2912A6-9505-4C94-BCDB-495CA5B0D52E}" type="datetimeFigureOut">
               <a:rPr lang="en-US" smtClean="0"/>
-              <a:t>7/26/2023</a:t>
+              <a:t>7/27/2023</a:t>
             </a:fld>
             <a:endParaRPr lang="en-US"/>
           </a:p>
@@ -4868,7 +4868,7 @@
           <a:p>
             <a:fld id="{3F2912A6-9505-4C94-BCDB-495CA5B0D52E}" type="datetimeFigureOut">
               <a:rPr lang="en-US" smtClean="0"/>
-              <a:t>7/26/2023</a:t>
+              <a:t>7/27/2023</a:t>
             </a:fld>
             <a:endParaRPr lang="en-US"/>
           </a:p>
@@ -5143,7 +5143,7 @@
           <a:p>
             <a:fld id="{3F2912A6-9505-4C94-BCDB-495CA5B0D52E}" type="datetimeFigureOut">
               <a:rPr lang="en-US" smtClean="0"/>
-              <a:t>7/26/2023</a:t>
+              <a:t>7/27/2023</a:t>
             </a:fld>
             <a:endParaRPr lang="en-US"/>
           </a:p>
@@ -5572,7 +5572,7 @@
           <a:p>
             <a:fld id="{3F2912A6-9505-4C94-BCDB-495CA5B0D52E}" type="datetimeFigureOut">
               <a:rPr lang="en-US" smtClean="0"/>
-              <a:t>7/26/2023</a:t>
+              <a:t>7/27/2023</a:t>
             </a:fld>
             <a:endParaRPr lang="en-US"/>
           </a:p>
@@ -6353,10 +6353,10 @@
       </p:sp>
       <p:pic>
         <p:nvPicPr>
-          <p:cNvPr id="2050" name="Picture 2">
+          <p:cNvPr id="1026" name="Picture 2">
             <a:extLst>
               <a:ext uri="{FF2B5EF4-FFF2-40B4-BE49-F238E27FC236}">
-                <a16:creationId xmlns:a16="http://schemas.microsoft.com/office/drawing/2014/main" id="{2C4A18C5-F2BB-08EF-5C3A-C86A62044E01}"/>
+                <a16:creationId xmlns:a16="http://schemas.microsoft.com/office/drawing/2014/main" id="{8A670187-9043-604D-F79B-8BE62939411B}"/>
               </a:ext>
             </a:extLst>
           </p:cNvPr>
@@ -6380,7 +6380,7 @@
         </p:blipFill>
         <p:spPr bwMode="auto">
           <a:xfrm>
-            <a:off x="5740212" y="1325563"/>
+            <a:off x="5885365" y="1190625"/>
             <a:ext cx="6000750" cy="4476750"/>
           </a:xfrm>
           <a:prstGeom prst="rect">
@@ -6389,7 +6389,7 @@
           <a:noFill/>
           <a:ln>
             <a:solidFill>
-              <a:schemeClr val="tx1"/>
+              <a:srgbClr val="B01513"/>
             </a:solidFill>
           </a:ln>
           <a:extLst>

</xml_diff>